<commit_message>
Add image of challenge
</commit_message>
<xml_diff>
--- a/projects/capstone/imgs/custom_imgs.pptx
+++ b/projects/capstone/imgs/custom_imgs.pptx
@@ -104,6 +104,11 @@
       </a:defRPr>
     </a:lvl9pPr>
   </p:defaultTextStyle>
+  <p:extLst>
+    <p:ext uri="{EFAFB233-063F-42B5-8137-9DF3F51BA10A}">
+      <p15:sldGuideLst xmlns:p15="http://schemas.microsoft.com/office/powerpoint/2012/main"/>
+    </p:ext>
+  </p:extLst>
 </p:presentation>
 </file>
 
@@ -2964,6 +2969,867 @@
           <a:chExt cx="0" cy="0"/>
         </a:xfrm>
       </p:grpSpPr>
+      <p:graphicFrame>
+        <p:nvGraphicFramePr>
+          <p:cNvPr id="2" name="Table 1"/>
+          <p:cNvGraphicFramePr>
+            <a:graphicFrameLocks noGrp="1"/>
+          </p:cNvGraphicFramePr>
+          <p:nvPr>
+            <p:extLst>
+              <p:ext uri="{D42A27DB-BD31-4B8C-83A1-F6EECF244321}">
+                <p14:modId xmlns:p14="http://schemas.microsoft.com/office/powerpoint/2010/main" val="3513299350"/>
+              </p:ext>
+            </p:extLst>
+          </p:nvPr>
+        </p:nvGraphicFramePr>
+        <p:xfrm>
+          <a:off x="2878666" y="1447800"/>
+          <a:ext cx="2880000" cy="2880000"/>
+        </p:xfrm>
+        <a:graphic>
+          <a:graphicData uri="http://schemas.openxmlformats.org/drawingml/2006/table">
+            <a:tbl>
+              <a:tblPr firstRow="1" bandRow="1"/>
+              <a:tblGrid>
+                <a:gridCol w="576000"/>
+                <a:gridCol w="576000"/>
+                <a:gridCol w="576000"/>
+                <a:gridCol w="576000"/>
+                <a:gridCol w="576000"/>
+              </a:tblGrid>
+              <a:tr h="576000">
+                <a:tc>
+                  <a:txBody>
+                    <a:bodyPr/>
+                    <a:lstStyle/>
+                    <a:p>
+                      <a:pPr algn="ctr"/>
+                      <a:r>
+                        <a:rPr lang="en-AU" dirty="0" smtClean="0"/>
+                        <a:t>5</a:t>
+                      </a:r>
+                      <a:endParaRPr lang="en-AU" dirty="0"/>
+                    </a:p>
+                  </a:txBody>
+                  <a:tcPr anchor="ctr"/>
+                </a:tc>
+                <a:tc>
+                  <a:txBody>
+                    <a:bodyPr/>
+                    <a:lstStyle/>
+                    <a:p>
+                      <a:pPr algn="ctr"/>
+                      <a:r>
+                        <a:rPr lang="en-AU" dirty="0" smtClean="0"/>
+                        <a:t>5</a:t>
+                      </a:r>
+                      <a:endParaRPr lang="en-AU" dirty="0"/>
+                    </a:p>
+                  </a:txBody>
+                  <a:tcPr anchor="ctr"/>
+                </a:tc>
+                <a:tc>
+                  <a:txBody>
+                    <a:bodyPr/>
+                    <a:lstStyle/>
+                    <a:p>
+                      <a:pPr algn="ctr"/>
+                      <a:endParaRPr lang="en-AU" dirty="0"/>
+                    </a:p>
+                  </a:txBody>
+                  <a:tcPr anchor="ctr"/>
+                </a:tc>
+                <a:tc>
+                  <a:txBody>
+                    <a:bodyPr/>
+                    <a:lstStyle/>
+                    <a:p>
+                      <a:pPr algn="ctr"/>
+                      <a:endParaRPr lang="en-AU" dirty="0"/>
+                    </a:p>
+                  </a:txBody>
+                  <a:tcPr anchor="ctr"/>
+                </a:tc>
+                <a:tc>
+                  <a:txBody>
+                    <a:bodyPr/>
+                    <a:lstStyle/>
+                    <a:p>
+                      <a:pPr algn="ctr"/>
+                      <a:endParaRPr lang="en-AU" dirty="0"/>
+                    </a:p>
+                  </a:txBody>
+                  <a:tcPr anchor="ctr"/>
+                </a:tc>
+              </a:tr>
+              <a:tr h="576000">
+                <a:tc>
+                  <a:txBody>
+                    <a:bodyPr/>
+                    <a:lstStyle/>
+                    <a:p>
+                      <a:pPr algn="ctr"/>
+                      <a:endParaRPr lang="en-AU" dirty="0"/>
+                    </a:p>
+                  </a:txBody>
+                  <a:tcPr anchor="ctr"/>
+                </a:tc>
+                <a:tc>
+                  <a:txBody>
+                    <a:bodyPr/>
+                    <a:lstStyle/>
+                    <a:p>
+                      <a:pPr algn="ctr"/>
+                      <a:r>
+                        <a:rPr lang="en-AU" dirty="0" smtClean="0"/>
+                        <a:t>2</a:t>
+                      </a:r>
+                      <a:endParaRPr lang="en-AU" dirty="0"/>
+                    </a:p>
+                  </a:txBody>
+                  <a:tcPr anchor="ctr"/>
+                </a:tc>
+                <a:tc>
+                  <a:txBody>
+                    <a:bodyPr/>
+                    <a:lstStyle/>
+                    <a:p>
+                      <a:pPr algn="ctr"/>
+                      <a:endParaRPr lang="en-AU" dirty="0"/>
+                    </a:p>
+                  </a:txBody>
+                  <a:tcPr anchor="ctr"/>
+                </a:tc>
+                <a:tc>
+                  <a:txBody>
+                    <a:bodyPr/>
+                    <a:lstStyle/>
+                    <a:p>
+                      <a:pPr algn="ctr"/>
+                      <a:r>
+                        <a:rPr lang="en-AU" dirty="0" smtClean="0"/>
+                        <a:t>4</a:t>
+                      </a:r>
+                      <a:endParaRPr lang="en-AU" dirty="0"/>
+                    </a:p>
+                  </a:txBody>
+                  <a:tcPr anchor="ctr"/>
+                </a:tc>
+                <a:tc>
+                  <a:txBody>
+                    <a:bodyPr/>
+                    <a:lstStyle/>
+                    <a:p>
+                      <a:pPr algn="ctr"/>
+                      <a:endParaRPr lang="en-AU" dirty="0"/>
+                    </a:p>
+                  </a:txBody>
+                  <a:tcPr anchor="ctr"/>
+                </a:tc>
+              </a:tr>
+              <a:tr h="576000">
+                <a:tc>
+                  <a:txBody>
+                    <a:bodyPr/>
+                    <a:lstStyle/>
+                    <a:p>
+                      <a:pPr algn="ctr"/>
+                      <a:r>
+                        <a:rPr lang="en-AU" dirty="0" smtClean="0"/>
+                        <a:t>1</a:t>
+                      </a:r>
+                      <a:endParaRPr lang="en-AU" dirty="0"/>
+                    </a:p>
+                  </a:txBody>
+                  <a:tcPr anchor="ctr"/>
+                </a:tc>
+                <a:tc>
+                  <a:txBody>
+                    <a:bodyPr/>
+                    <a:lstStyle/>
+                    <a:p>
+                      <a:pPr algn="ctr"/>
+                      <a:endParaRPr lang="en-AU" dirty="0"/>
+                    </a:p>
+                  </a:txBody>
+                  <a:tcPr anchor="ctr"/>
+                </a:tc>
+                <a:tc>
+                  <a:txBody>
+                    <a:bodyPr/>
+                    <a:lstStyle/>
+                    <a:p>
+                      <a:pPr algn="ctr"/>
+                      <a:endParaRPr lang="en-AU" dirty="0"/>
+                    </a:p>
+                  </a:txBody>
+                  <a:tcPr anchor="ctr"/>
+                </a:tc>
+                <a:tc>
+                  <a:txBody>
+                    <a:bodyPr/>
+                    <a:lstStyle/>
+                    <a:p>
+                      <a:pPr algn="ctr"/>
+                      <a:r>
+                        <a:rPr lang="en-AU" dirty="0" smtClean="0"/>
+                        <a:t>5</a:t>
+                      </a:r>
+                      <a:endParaRPr lang="en-AU" dirty="0"/>
+                    </a:p>
+                  </a:txBody>
+                  <a:tcPr anchor="ctr"/>
+                </a:tc>
+                <a:tc>
+                  <a:txBody>
+                    <a:bodyPr/>
+                    <a:lstStyle/>
+                    <a:p>
+                      <a:pPr algn="ctr"/>
+                      <a:r>
+                        <a:rPr lang="en-AU" dirty="0" smtClean="0"/>
+                        <a:t>3</a:t>
+                      </a:r>
+                      <a:endParaRPr lang="en-AU" dirty="0"/>
+                    </a:p>
+                  </a:txBody>
+                  <a:tcPr anchor="ctr"/>
+                </a:tc>
+              </a:tr>
+              <a:tr h="576000">
+                <a:tc>
+                  <a:txBody>
+                    <a:bodyPr/>
+                    <a:lstStyle/>
+                    <a:p>
+                      <a:pPr algn="ctr"/>
+                      <a:endParaRPr lang="en-AU"/>
+                    </a:p>
+                  </a:txBody>
+                  <a:tcPr anchor="ctr"/>
+                </a:tc>
+                <a:tc>
+                  <a:txBody>
+                    <a:bodyPr/>
+                    <a:lstStyle/>
+                    <a:p>
+                      <a:pPr algn="ctr"/>
+                      <a:r>
+                        <a:rPr lang="en-AU" dirty="0" smtClean="0"/>
+                        <a:t>4</a:t>
+                      </a:r>
+                      <a:endParaRPr lang="en-AU" dirty="0"/>
+                    </a:p>
+                  </a:txBody>
+                  <a:tcPr anchor="ctr"/>
+                </a:tc>
+                <a:tc>
+                  <a:txBody>
+                    <a:bodyPr/>
+                    <a:lstStyle/>
+                    <a:p>
+                      <a:pPr algn="ctr"/>
+                      <a:r>
+                        <a:rPr lang="en-AU" dirty="0" smtClean="0"/>
+                        <a:t>5</a:t>
+                      </a:r>
+                      <a:endParaRPr lang="en-AU" dirty="0"/>
+                    </a:p>
+                  </a:txBody>
+                  <a:tcPr anchor="ctr"/>
+                </a:tc>
+                <a:tc>
+                  <a:txBody>
+                    <a:bodyPr/>
+                    <a:lstStyle/>
+                    <a:p>
+                      <a:pPr algn="ctr"/>
+                      <a:endParaRPr lang="en-AU" dirty="0"/>
+                    </a:p>
+                  </a:txBody>
+                  <a:tcPr anchor="ctr"/>
+                </a:tc>
+                <a:tc>
+                  <a:txBody>
+                    <a:bodyPr/>
+                    <a:lstStyle/>
+                    <a:p>
+                      <a:pPr algn="ctr"/>
+                      <a:endParaRPr lang="en-AU" dirty="0"/>
+                    </a:p>
+                  </a:txBody>
+                  <a:tcPr anchor="ctr"/>
+                </a:tc>
+              </a:tr>
+              <a:tr h="576000">
+                <a:tc>
+                  <a:txBody>
+                    <a:bodyPr/>
+                    <a:lstStyle/>
+                    <a:p>
+                      <a:pPr algn="ctr"/>
+                      <a:r>
+                        <a:rPr lang="en-AU" dirty="0" smtClean="0"/>
+                        <a:t>2</a:t>
+                      </a:r>
+                      <a:endParaRPr lang="en-AU" dirty="0"/>
+                    </a:p>
+                  </a:txBody>
+                  <a:tcPr anchor="ctr"/>
+                </a:tc>
+                <a:tc>
+                  <a:txBody>
+                    <a:bodyPr/>
+                    <a:lstStyle/>
+                    <a:p>
+                      <a:pPr algn="ctr"/>
+                      <a:endParaRPr lang="en-AU" dirty="0"/>
+                    </a:p>
+                  </a:txBody>
+                  <a:tcPr anchor="ctr"/>
+                </a:tc>
+                <a:tc>
+                  <a:txBody>
+                    <a:bodyPr/>
+                    <a:lstStyle/>
+                    <a:p>
+                      <a:pPr algn="ctr"/>
+                      <a:endParaRPr lang="en-AU" dirty="0"/>
+                    </a:p>
+                  </a:txBody>
+                  <a:tcPr anchor="ctr"/>
+                </a:tc>
+                <a:tc>
+                  <a:txBody>
+                    <a:bodyPr/>
+                    <a:lstStyle/>
+                    <a:p>
+                      <a:pPr algn="ctr"/>
+                      <a:r>
+                        <a:rPr lang="en-AU" dirty="0" smtClean="0"/>
+                        <a:t>4</a:t>
+                      </a:r>
+                      <a:endParaRPr lang="en-AU" dirty="0"/>
+                    </a:p>
+                  </a:txBody>
+                  <a:tcPr anchor="ctr"/>
+                </a:tc>
+                <a:tc>
+                  <a:txBody>
+                    <a:bodyPr/>
+                    <a:lstStyle/>
+                    <a:p>
+                      <a:pPr algn="ctr"/>
+                      <a:endParaRPr lang="en-AU" dirty="0"/>
+                    </a:p>
+                  </a:txBody>
+                  <a:tcPr anchor="ctr"/>
+                </a:tc>
+              </a:tr>
+            </a:tbl>
+          </a:graphicData>
+        </a:graphic>
+      </p:graphicFrame>
+      <p:pic>
+        <p:nvPicPr>
+          <p:cNvPr id="1026" name="Picture 2" descr="Image result for user icon"/>
+          <p:cNvPicPr>
+            <a:picLocks noChangeAspect="1" noChangeArrowheads="1"/>
+          </p:cNvPicPr>
+          <p:nvPr/>
+        </p:nvPicPr>
+        <p:blipFill>
+          <a:blip r:embed="rId2">
+            <a:extLst>
+              <a:ext uri="{28A0092B-C50C-407E-A947-70E740481C1C}">
+                <a14:useLocalDpi xmlns:a14="http://schemas.microsoft.com/office/drawing/2010/main" val="0"/>
+              </a:ext>
+            </a:extLst>
+          </a:blip>
+          <a:srcRect/>
+          <a:stretch>
+            <a:fillRect/>
+          </a:stretch>
+        </p:blipFill>
+        <p:spPr bwMode="auto">
+          <a:xfrm>
+            <a:off x="2353075" y="2026877"/>
+            <a:ext cx="563691" cy="563691"/>
+          </a:xfrm>
+          <a:prstGeom prst="rect">
+            <a:avLst/>
+          </a:prstGeom>
+          <a:noFill/>
+          <a:extLst>
+            <a:ext uri="{909E8E84-426E-40DD-AFC4-6F175D3DCCD1}">
+              <a14:hiddenFill xmlns:a14="http://schemas.microsoft.com/office/drawing/2010/main">
+                <a:solidFill>
+                  <a:srgbClr val="FFFFFF"/>
+                </a:solidFill>
+              </a14:hiddenFill>
+            </a:ext>
+          </a:extLst>
+        </p:spPr>
+      </p:pic>
+      <p:pic>
+        <p:nvPicPr>
+          <p:cNvPr id="5" name="Picture 2" descr="Image result for user icon"/>
+          <p:cNvPicPr>
+            <a:picLocks noChangeAspect="1" noChangeArrowheads="1"/>
+          </p:cNvPicPr>
+          <p:nvPr/>
+        </p:nvPicPr>
+        <p:blipFill>
+          <a:blip r:embed="rId2">
+            <a:extLst>
+              <a:ext uri="{28A0092B-C50C-407E-A947-70E740481C1C}">
+                <a14:useLocalDpi xmlns:a14="http://schemas.microsoft.com/office/drawing/2010/main" val="0"/>
+              </a:ext>
+            </a:extLst>
+          </a:blip>
+          <a:srcRect/>
+          <a:stretch>
+            <a:fillRect/>
+          </a:stretch>
+        </p:blipFill>
+        <p:spPr bwMode="auto">
+          <a:xfrm>
+            <a:off x="2353075" y="2605954"/>
+            <a:ext cx="563691" cy="563691"/>
+          </a:xfrm>
+          <a:prstGeom prst="rect">
+            <a:avLst/>
+          </a:prstGeom>
+          <a:noFill/>
+          <a:extLst>
+            <a:ext uri="{909E8E84-426E-40DD-AFC4-6F175D3DCCD1}">
+              <a14:hiddenFill xmlns:a14="http://schemas.microsoft.com/office/drawing/2010/main">
+                <a:solidFill>
+                  <a:srgbClr val="FFFFFF"/>
+                </a:solidFill>
+              </a14:hiddenFill>
+            </a:ext>
+          </a:extLst>
+        </p:spPr>
+      </p:pic>
+      <p:pic>
+        <p:nvPicPr>
+          <p:cNvPr id="6" name="Picture 2" descr="Image result for user icon"/>
+          <p:cNvPicPr>
+            <a:picLocks noChangeAspect="1" noChangeArrowheads="1"/>
+          </p:cNvPicPr>
+          <p:nvPr/>
+        </p:nvPicPr>
+        <p:blipFill>
+          <a:blip r:embed="rId2">
+            <a:extLst>
+              <a:ext uri="{28A0092B-C50C-407E-A947-70E740481C1C}">
+                <a14:useLocalDpi xmlns:a14="http://schemas.microsoft.com/office/drawing/2010/main" val="0"/>
+              </a:ext>
+            </a:extLst>
+          </a:blip>
+          <a:srcRect/>
+          <a:stretch>
+            <a:fillRect/>
+          </a:stretch>
+        </p:blipFill>
+        <p:spPr bwMode="auto">
+          <a:xfrm>
+            <a:off x="2353075" y="3185031"/>
+            <a:ext cx="563691" cy="563691"/>
+          </a:xfrm>
+          <a:prstGeom prst="rect">
+            <a:avLst/>
+          </a:prstGeom>
+          <a:noFill/>
+          <a:extLst>
+            <a:ext uri="{909E8E84-426E-40DD-AFC4-6F175D3DCCD1}">
+              <a14:hiddenFill xmlns:a14="http://schemas.microsoft.com/office/drawing/2010/main">
+                <a:solidFill>
+                  <a:srgbClr val="FFFFFF"/>
+                </a:solidFill>
+              </a14:hiddenFill>
+            </a:ext>
+          </a:extLst>
+        </p:spPr>
+      </p:pic>
+      <p:pic>
+        <p:nvPicPr>
+          <p:cNvPr id="7" name="Picture 2" descr="Image result for user icon"/>
+          <p:cNvPicPr>
+            <a:picLocks noChangeAspect="1" noChangeArrowheads="1"/>
+          </p:cNvPicPr>
+          <p:nvPr/>
+        </p:nvPicPr>
+        <p:blipFill>
+          <a:blip r:embed="rId2">
+            <a:extLst>
+              <a:ext uri="{28A0092B-C50C-407E-A947-70E740481C1C}">
+                <a14:useLocalDpi xmlns:a14="http://schemas.microsoft.com/office/drawing/2010/main" val="0"/>
+              </a:ext>
+            </a:extLst>
+          </a:blip>
+          <a:srcRect/>
+          <a:stretch>
+            <a:fillRect/>
+          </a:stretch>
+        </p:blipFill>
+        <p:spPr bwMode="auto">
+          <a:xfrm>
+            <a:off x="2353075" y="3764109"/>
+            <a:ext cx="563691" cy="563691"/>
+          </a:xfrm>
+          <a:prstGeom prst="rect">
+            <a:avLst/>
+          </a:prstGeom>
+          <a:noFill/>
+          <a:extLst>
+            <a:ext uri="{909E8E84-426E-40DD-AFC4-6F175D3DCCD1}">
+              <a14:hiddenFill xmlns:a14="http://schemas.microsoft.com/office/drawing/2010/main">
+                <a:solidFill>
+                  <a:srgbClr val="FFFFFF"/>
+                </a:solidFill>
+              </a14:hiddenFill>
+            </a:ext>
+          </a:extLst>
+        </p:spPr>
+      </p:pic>
+      <p:pic>
+        <p:nvPicPr>
+          <p:cNvPr id="10" name="Picture 2" descr="Image result for user icon"/>
+          <p:cNvPicPr>
+            <a:picLocks noChangeAspect="1" noChangeArrowheads="1"/>
+          </p:cNvPicPr>
+          <p:nvPr/>
+        </p:nvPicPr>
+        <p:blipFill>
+          <a:blip r:embed="rId2">
+            <a:extLst>
+              <a:ext uri="{28A0092B-C50C-407E-A947-70E740481C1C}">
+                <a14:useLocalDpi xmlns:a14="http://schemas.microsoft.com/office/drawing/2010/main" val="0"/>
+              </a:ext>
+            </a:extLst>
+          </a:blip>
+          <a:srcRect/>
+          <a:stretch>
+            <a:fillRect/>
+          </a:stretch>
+        </p:blipFill>
+        <p:spPr bwMode="auto">
+          <a:xfrm>
+            <a:off x="2353075" y="1447800"/>
+            <a:ext cx="563691" cy="563691"/>
+          </a:xfrm>
+          <a:prstGeom prst="rect">
+            <a:avLst/>
+          </a:prstGeom>
+          <a:noFill/>
+          <a:extLst>
+            <a:ext uri="{909E8E84-426E-40DD-AFC4-6F175D3DCCD1}">
+              <a14:hiddenFill xmlns:a14="http://schemas.microsoft.com/office/drawing/2010/main">
+                <a:solidFill>
+                  <a:srgbClr val="FFFFFF"/>
+                </a:solidFill>
+              </a14:hiddenFill>
+            </a:ext>
+          </a:extLst>
+        </p:spPr>
+      </p:pic>
+      <p:pic>
+        <p:nvPicPr>
+          <p:cNvPr id="3" name="Picture 2"/>
+          <p:cNvPicPr>
+            <a:picLocks noChangeAspect="1"/>
+          </p:cNvPicPr>
+          <p:nvPr/>
+        </p:nvPicPr>
+        <p:blipFill>
+          <a:blip r:embed="rId3" cstate="print">
+            <a:extLst>
+              <a:ext uri="{28A0092B-C50C-407E-A947-70E740481C1C}">
+                <a14:useLocalDpi xmlns:a14="http://schemas.microsoft.com/office/drawing/2010/main" val="0"/>
+              </a:ext>
+            </a:extLst>
+          </a:blip>
+          <a:stretch>
+            <a:fillRect/>
+          </a:stretch>
+        </p:blipFill>
+        <p:spPr>
+          <a:xfrm>
+            <a:off x="2942167" y="996950"/>
+            <a:ext cx="444500" cy="444500"/>
+          </a:xfrm>
+          <a:prstGeom prst="rect">
+            <a:avLst/>
+          </a:prstGeom>
+        </p:spPr>
+      </p:pic>
+      <p:pic>
+        <p:nvPicPr>
+          <p:cNvPr id="12" name="Picture 11"/>
+          <p:cNvPicPr>
+            <a:picLocks noChangeAspect="1"/>
+          </p:cNvPicPr>
+          <p:nvPr/>
+        </p:nvPicPr>
+        <p:blipFill>
+          <a:blip r:embed="rId3" cstate="print">
+            <a:extLst>
+              <a:ext uri="{28A0092B-C50C-407E-A947-70E740481C1C}">
+                <a14:useLocalDpi xmlns:a14="http://schemas.microsoft.com/office/drawing/2010/main" val="0"/>
+              </a:ext>
+            </a:extLst>
+          </a:blip>
+          <a:stretch>
+            <a:fillRect/>
+          </a:stretch>
+        </p:blipFill>
+        <p:spPr>
+          <a:xfrm>
+            <a:off x="5269716" y="996950"/>
+            <a:ext cx="444500" cy="444500"/>
+          </a:xfrm>
+          <a:prstGeom prst="rect">
+            <a:avLst/>
+          </a:prstGeom>
+        </p:spPr>
+      </p:pic>
+      <p:pic>
+        <p:nvPicPr>
+          <p:cNvPr id="13" name="Picture 12"/>
+          <p:cNvPicPr>
+            <a:picLocks noChangeAspect="1"/>
+          </p:cNvPicPr>
+          <p:nvPr/>
+        </p:nvPicPr>
+        <p:blipFill>
+          <a:blip r:embed="rId3" cstate="print">
+            <a:extLst>
+              <a:ext uri="{28A0092B-C50C-407E-A947-70E740481C1C}">
+                <a14:useLocalDpi xmlns:a14="http://schemas.microsoft.com/office/drawing/2010/main" val="0"/>
+              </a:ext>
+            </a:extLst>
+          </a:blip>
+          <a:stretch>
+            <a:fillRect/>
+          </a:stretch>
+        </p:blipFill>
+        <p:spPr>
+          <a:xfrm>
+            <a:off x="3524054" y="996950"/>
+            <a:ext cx="444500" cy="444500"/>
+          </a:xfrm>
+          <a:prstGeom prst="rect">
+            <a:avLst/>
+          </a:prstGeom>
+        </p:spPr>
+      </p:pic>
+      <p:pic>
+        <p:nvPicPr>
+          <p:cNvPr id="14" name="Picture 13"/>
+          <p:cNvPicPr>
+            <a:picLocks noChangeAspect="1"/>
+          </p:cNvPicPr>
+          <p:nvPr/>
+        </p:nvPicPr>
+        <p:blipFill>
+          <a:blip r:embed="rId3" cstate="print">
+            <a:extLst>
+              <a:ext uri="{28A0092B-C50C-407E-A947-70E740481C1C}">
+                <a14:useLocalDpi xmlns:a14="http://schemas.microsoft.com/office/drawing/2010/main" val="0"/>
+              </a:ext>
+            </a:extLst>
+          </a:blip>
+          <a:stretch>
+            <a:fillRect/>
+          </a:stretch>
+        </p:blipFill>
+        <p:spPr>
+          <a:xfrm>
+            <a:off x="4105941" y="996950"/>
+            <a:ext cx="444500" cy="444500"/>
+          </a:xfrm>
+          <a:prstGeom prst="rect">
+            <a:avLst/>
+          </a:prstGeom>
+        </p:spPr>
+      </p:pic>
+      <p:pic>
+        <p:nvPicPr>
+          <p:cNvPr id="15" name="Picture 14"/>
+          <p:cNvPicPr>
+            <a:picLocks noChangeAspect="1"/>
+          </p:cNvPicPr>
+          <p:nvPr/>
+        </p:nvPicPr>
+        <p:blipFill>
+          <a:blip r:embed="rId3" cstate="print">
+            <a:extLst>
+              <a:ext uri="{28A0092B-C50C-407E-A947-70E740481C1C}">
+                <a14:useLocalDpi xmlns:a14="http://schemas.microsoft.com/office/drawing/2010/main" val="0"/>
+              </a:ext>
+            </a:extLst>
+          </a:blip>
+          <a:stretch>
+            <a:fillRect/>
+          </a:stretch>
+        </p:blipFill>
+        <p:spPr>
+          <a:xfrm>
+            <a:off x="4687828" y="996950"/>
+            <a:ext cx="444500" cy="444500"/>
+          </a:xfrm>
+          <a:prstGeom prst="rect">
+            <a:avLst/>
+          </a:prstGeom>
+        </p:spPr>
+      </p:pic>
+      <p:graphicFrame>
+        <p:nvGraphicFramePr>
+          <p:cNvPr id="16" name="Table 15"/>
+          <p:cNvGraphicFramePr>
+            <a:graphicFrameLocks noGrp="1"/>
+          </p:cNvGraphicFramePr>
+          <p:nvPr>
+            <p:extLst>
+              <p:ext uri="{D42A27DB-BD31-4B8C-83A1-F6EECF244321}">
+                <p14:modId xmlns:p14="http://schemas.microsoft.com/office/powerpoint/2010/main" val="908613339"/>
+              </p:ext>
+            </p:extLst>
+          </p:nvPr>
+        </p:nvGraphicFramePr>
+        <p:xfrm>
+          <a:off x="5896053" y="1447800"/>
+          <a:ext cx="576000" cy="2880000"/>
+        </p:xfrm>
+        <a:graphic>
+          <a:graphicData uri="http://schemas.openxmlformats.org/drawingml/2006/table">
+            <a:tbl>
+              <a:tblPr firstRow="1" bandRow="1"/>
+              <a:tblGrid>
+                <a:gridCol w="576000"/>
+              </a:tblGrid>
+              <a:tr h="576000">
+                <a:tc>
+                  <a:txBody>
+                    <a:bodyPr/>
+                    <a:lstStyle/>
+                    <a:p>
+                      <a:pPr algn="ctr"/>
+                      <a:r>
+                        <a:rPr lang="en-AU" dirty="0" smtClean="0"/>
+                        <a:t>?</a:t>
+                      </a:r>
+                      <a:endParaRPr lang="en-AU" dirty="0"/>
+                    </a:p>
+                  </a:txBody>
+                  <a:tcPr anchor="ctr"/>
+                </a:tc>
+              </a:tr>
+              <a:tr h="576000">
+                <a:tc>
+                  <a:txBody>
+                    <a:bodyPr/>
+                    <a:lstStyle/>
+                    <a:p>
+                      <a:pPr algn="ctr"/>
+                      <a:r>
+                        <a:rPr lang="en-AU" dirty="0" smtClean="0"/>
+                        <a:t>?</a:t>
+                      </a:r>
+                      <a:endParaRPr lang="en-AU" dirty="0"/>
+                    </a:p>
+                  </a:txBody>
+                  <a:tcPr anchor="ctr"/>
+                </a:tc>
+              </a:tr>
+              <a:tr h="576000">
+                <a:tc>
+                  <a:txBody>
+                    <a:bodyPr/>
+                    <a:lstStyle/>
+                    <a:p>
+                      <a:pPr algn="ctr"/>
+                      <a:r>
+                        <a:rPr lang="en-AU" dirty="0" smtClean="0"/>
+                        <a:t>?</a:t>
+                      </a:r>
+                      <a:endParaRPr lang="en-AU" dirty="0"/>
+                    </a:p>
+                  </a:txBody>
+                  <a:tcPr anchor="ctr"/>
+                </a:tc>
+              </a:tr>
+              <a:tr h="576000">
+                <a:tc>
+                  <a:txBody>
+                    <a:bodyPr/>
+                    <a:lstStyle/>
+                    <a:p>
+                      <a:pPr algn="ctr"/>
+                      <a:r>
+                        <a:rPr lang="en-AU" dirty="0" smtClean="0"/>
+                        <a:t>?</a:t>
+                      </a:r>
+                      <a:endParaRPr lang="en-AU" dirty="0"/>
+                    </a:p>
+                  </a:txBody>
+                  <a:tcPr anchor="ctr"/>
+                </a:tc>
+              </a:tr>
+              <a:tr h="576000">
+                <a:tc>
+                  <a:txBody>
+                    <a:bodyPr/>
+                    <a:lstStyle/>
+                    <a:p>
+                      <a:pPr algn="ctr"/>
+                      <a:r>
+                        <a:rPr lang="en-AU" dirty="0" smtClean="0"/>
+                        <a:t>?</a:t>
+                      </a:r>
+                      <a:endParaRPr lang="en-AU" dirty="0"/>
+                    </a:p>
+                  </a:txBody>
+                  <a:tcPr anchor="ctr"/>
+                </a:tc>
+              </a:tr>
+            </a:tbl>
+          </a:graphicData>
+        </a:graphic>
+      </p:graphicFrame>
+      <p:pic>
+        <p:nvPicPr>
+          <p:cNvPr id="17" name="Picture 16"/>
+          <p:cNvPicPr>
+            <a:picLocks noChangeAspect="1"/>
+          </p:cNvPicPr>
+          <p:nvPr/>
+        </p:nvPicPr>
+        <p:blipFill>
+          <a:blip r:embed="rId3" cstate="print">
+            <a:extLst>
+              <a:ext uri="{28A0092B-C50C-407E-A947-70E740481C1C}">
+                <a14:useLocalDpi xmlns:a14="http://schemas.microsoft.com/office/drawing/2010/main" val="0"/>
+              </a:ext>
+            </a:extLst>
+          </a:blip>
+          <a:stretch>
+            <a:fillRect/>
+          </a:stretch>
+        </p:blipFill>
+        <p:spPr>
+          <a:xfrm>
+            <a:off x="5961803" y="996950"/>
+            <a:ext cx="444500" cy="444500"/>
+          </a:xfrm>
+          <a:prstGeom prst="rect">
+            <a:avLst/>
+          </a:prstGeom>
+        </p:spPr>
+      </p:pic>
     </p:spTree>
     <p:extLst>
       <p:ext uri="{BB962C8B-B14F-4D97-AF65-F5344CB8AC3E}">

</xml_diff>

<commit_message>
Add IMDB into problem statement
</commit_message>
<xml_diff>
--- a/projects/capstone/imgs/custom_imgs.pptx
+++ b/projects/capstone/imgs/custom_imgs.pptx
@@ -6,6 +6,7 @@
   </p:sldMasterIdLst>
   <p:sldIdLst>
     <p:sldId id="256" r:id="rId2"/>
+    <p:sldId id="257" r:id="rId3"/>
   </p:sldIdLst>
   <p:sldSz cx="12192000" cy="6858000"/>
   <p:notesSz cx="6858000" cy="9144000"/>
@@ -3843,6 +3844,903 @@
 </p:sld>
 </file>
 
+<file path=ppt/slides/slide2.xml><?xml version="1.0" encoding="utf-8"?>
+<p:sld xmlns:a="http://schemas.openxmlformats.org/drawingml/2006/main" xmlns:r="http://schemas.openxmlformats.org/officeDocument/2006/relationships" xmlns:p="http://schemas.openxmlformats.org/presentationml/2006/main">
+  <p:cSld>
+    <p:spTree>
+      <p:nvGrpSpPr>
+        <p:cNvPr id="1" name=""/>
+        <p:cNvGrpSpPr/>
+        <p:nvPr/>
+      </p:nvGrpSpPr>
+      <p:grpSpPr>
+        <a:xfrm>
+          <a:off x="0" y="0"/>
+          <a:ext cx="0" cy="0"/>
+          <a:chOff x="0" y="0"/>
+          <a:chExt cx="0" cy="0"/>
+        </a:xfrm>
+      </p:grpSpPr>
+      <p:graphicFrame>
+        <p:nvGraphicFramePr>
+          <p:cNvPr id="2" name="Table 1"/>
+          <p:cNvGraphicFramePr>
+            <a:graphicFrameLocks noGrp="1"/>
+          </p:cNvGraphicFramePr>
+          <p:nvPr>
+            <p:extLst>
+              <p:ext uri="{D42A27DB-BD31-4B8C-83A1-F6EECF244321}">
+                <p14:modId xmlns:p14="http://schemas.microsoft.com/office/powerpoint/2010/main" val="3932762930"/>
+              </p:ext>
+            </p:extLst>
+          </p:nvPr>
+        </p:nvGraphicFramePr>
+        <p:xfrm>
+          <a:off x="2878666" y="1447800"/>
+          <a:ext cx="2880000" cy="2880000"/>
+        </p:xfrm>
+        <a:graphic>
+          <a:graphicData uri="http://schemas.openxmlformats.org/drawingml/2006/table">
+            <a:tbl>
+              <a:tblPr firstRow="1" bandRow="1"/>
+              <a:tblGrid>
+                <a:gridCol w="576000"/>
+                <a:gridCol w="576000"/>
+                <a:gridCol w="576000"/>
+                <a:gridCol w="576000"/>
+                <a:gridCol w="576000"/>
+              </a:tblGrid>
+              <a:tr h="576000">
+                <a:tc>
+                  <a:txBody>
+                    <a:bodyPr/>
+                    <a:lstStyle/>
+                    <a:p>
+                      <a:pPr algn="ctr"/>
+                      <a:r>
+                        <a:rPr lang="en-AU" dirty="0" smtClean="0"/>
+                        <a:t>9.8</a:t>
+                      </a:r>
+                      <a:endParaRPr lang="en-AU" dirty="0"/>
+                    </a:p>
+                  </a:txBody>
+                  <a:tcPr anchor="ctr"/>
+                </a:tc>
+                <a:tc>
+                  <a:txBody>
+                    <a:bodyPr/>
+                    <a:lstStyle/>
+                    <a:p>
+                      <a:pPr algn="ctr"/>
+                      <a:r>
+                        <a:rPr lang="en-AU" dirty="0" smtClean="0"/>
+                        <a:t>6.2</a:t>
+                      </a:r>
+                      <a:endParaRPr lang="en-AU" dirty="0"/>
+                    </a:p>
+                  </a:txBody>
+                  <a:tcPr anchor="ctr"/>
+                </a:tc>
+                <a:tc>
+                  <a:txBody>
+                    <a:bodyPr/>
+                    <a:lstStyle/>
+                    <a:p>
+                      <a:pPr algn="ctr"/>
+                      <a:r>
+                        <a:rPr lang="en-AU" dirty="0" smtClean="0"/>
+                        <a:t>7.3</a:t>
+                      </a:r>
+                      <a:endParaRPr lang="en-AU" dirty="0"/>
+                    </a:p>
+                  </a:txBody>
+                  <a:tcPr anchor="ctr"/>
+                </a:tc>
+                <a:tc>
+                  <a:txBody>
+                    <a:bodyPr/>
+                    <a:lstStyle/>
+                    <a:p>
+                      <a:pPr algn="ctr"/>
+                      <a:r>
+                        <a:rPr lang="en-AU" dirty="0" smtClean="0"/>
+                        <a:t>8.1</a:t>
+                      </a:r>
+                      <a:endParaRPr lang="en-AU" dirty="0"/>
+                    </a:p>
+                  </a:txBody>
+                  <a:tcPr anchor="ctr"/>
+                </a:tc>
+                <a:tc>
+                  <a:txBody>
+                    <a:bodyPr/>
+                    <a:lstStyle/>
+                    <a:p>
+                      <a:pPr algn="ctr"/>
+                      <a:r>
+                        <a:rPr lang="en-AU" dirty="0" smtClean="0"/>
+                        <a:t>5.2</a:t>
+                      </a:r>
+                      <a:endParaRPr lang="en-AU" dirty="0"/>
+                    </a:p>
+                  </a:txBody>
+                  <a:tcPr anchor="ctr"/>
+                </a:tc>
+              </a:tr>
+              <a:tr h="576000">
+                <a:tc>
+                  <a:txBody>
+                    <a:bodyPr/>
+                    <a:lstStyle/>
+                    <a:p>
+                      <a:pPr algn="ctr"/>
+                      <a:r>
+                        <a:rPr lang="en-AU" dirty="0" smtClean="0"/>
+                        <a:t>20</a:t>
+                      </a:r>
+                      <a:endParaRPr lang="en-AU" dirty="0"/>
+                    </a:p>
+                  </a:txBody>
+                  <a:tcPr anchor="ctr"/>
+                </a:tc>
+                <a:tc>
+                  <a:txBody>
+                    <a:bodyPr/>
+                    <a:lstStyle/>
+                    <a:p>
+                      <a:pPr algn="ctr"/>
+                      <a:r>
+                        <a:rPr lang="en-AU" dirty="0" smtClean="0"/>
+                        <a:t>42</a:t>
+                      </a:r>
+                      <a:endParaRPr lang="en-AU" dirty="0"/>
+                    </a:p>
+                  </a:txBody>
+                  <a:tcPr anchor="ctr"/>
+                </a:tc>
+                <a:tc>
+                  <a:txBody>
+                    <a:bodyPr/>
+                    <a:lstStyle/>
+                    <a:p>
+                      <a:pPr algn="ctr"/>
+                      <a:r>
+                        <a:rPr lang="en-AU" dirty="0" smtClean="0"/>
+                        <a:t>53</a:t>
+                      </a:r>
+                      <a:endParaRPr lang="en-AU" dirty="0"/>
+                    </a:p>
+                  </a:txBody>
+                  <a:tcPr anchor="ctr"/>
+                </a:tc>
+                <a:tc>
+                  <a:txBody>
+                    <a:bodyPr/>
+                    <a:lstStyle/>
+                    <a:p>
+                      <a:pPr algn="ctr"/>
+                      <a:r>
+                        <a:rPr lang="en-AU" dirty="0" smtClean="0"/>
+                        <a:t>100</a:t>
+                      </a:r>
+                      <a:endParaRPr lang="en-AU" dirty="0"/>
+                    </a:p>
+                  </a:txBody>
+                  <a:tcPr anchor="ctr"/>
+                </a:tc>
+                <a:tc>
+                  <a:txBody>
+                    <a:bodyPr/>
+                    <a:lstStyle/>
+                    <a:p>
+                      <a:pPr algn="ctr"/>
+                      <a:r>
+                        <a:rPr lang="en-AU" dirty="0" smtClean="0"/>
+                        <a:t>24</a:t>
+                      </a:r>
+                      <a:endParaRPr lang="en-AU" dirty="0"/>
+                    </a:p>
+                  </a:txBody>
+                  <a:tcPr anchor="ctr"/>
+                </a:tc>
+              </a:tr>
+              <a:tr h="576000">
+                <a:tc>
+                  <a:txBody>
+                    <a:bodyPr/>
+                    <a:lstStyle/>
+                    <a:p>
+                      <a:pPr algn="ctr"/>
+                      <a:r>
+                        <a:rPr lang="en-AU" dirty="0" smtClean="0"/>
+                        <a:t>1</a:t>
+                      </a:r>
+                      <a:endParaRPr lang="en-AU" dirty="0"/>
+                    </a:p>
+                  </a:txBody>
+                  <a:tcPr anchor="ctr"/>
+                </a:tc>
+                <a:tc>
+                  <a:txBody>
+                    <a:bodyPr/>
+                    <a:lstStyle/>
+                    <a:p>
+                      <a:pPr algn="ctr"/>
+                      <a:r>
+                        <a:rPr lang="en-AU" dirty="0" smtClean="0"/>
+                        <a:t>0</a:t>
+                      </a:r>
+                      <a:endParaRPr lang="en-AU" dirty="0"/>
+                    </a:p>
+                  </a:txBody>
+                  <a:tcPr anchor="ctr"/>
+                </a:tc>
+                <a:tc>
+                  <a:txBody>
+                    <a:bodyPr/>
+                    <a:lstStyle/>
+                    <a:p>
+                      <a:pPr algn="ctr"/>
+                      <a:r>
+                        <a:rPr lang="en-AU" dirty="0" smtClean="0"/>
+                        <a:t>0</a:t>
+                      </a:r>
+                      <a:endParaRPr lang="en-AU" dirty="0"/>
+                    </a:p>
+                  </a:txBody>
+                  <a:tcPr anchor="ctr"/>
+                </a:tc>
+                <a:tc>
+                  <a:txBody>
+                    <a:bodyPr/>
+                    <a:lstStyle/>
+                    <a:p>
+                      <a:pPr algn="ctr"/>
+                      <a:r>
+                        <a:rPr lang="en-AU" dirty="0" smtClean="0"/>
+                        <a:t>1</a:t>
+                      </a:r>
+                      <a:endParaRPr lang="en-AU" dirty="0"/>
+                    </a:p>
+                  </a:txBody>
+                  <a:tcPr anchor="ctr"/>
+                </a:tc>
+                <a:tc>
+                  <a:txBody>
+                    <a:bodyPr/>
+                    <a:lstStyle/>
+                    <a:p>
+                      <a:pPr algn="ctr"/>
+                      <a:r>
+                        <a:rPr lang="en-AU" dirty="0" smtClean="0"/>
+                        <a:t>0</a:t>
+                      </a:r>
+                      <a:endParaRPr lang="en-AU" dirty="0"/>
+                    </a:p>
+                  </a:txBody>
+                  <a:tcPr anchor="ctr"/>
+                </a:tc>
+              </a:tr>
+              <a:tr h="576000">
+                <a:tc>
+                  <a:txBody>
+                    <a:bodyPr/>
+                    <a:lstStyle/>
+                    <a:p>
+                      <a:pPr algn="ctr"/>
+                      <a:r>
+                        <a:rPr lang="en-AU" dirty="0" smtClean="0"/>
+                        <a:t>0</a:t>
+                      </a:r>
+                      <a:endParaRPr lang="en-AU" dirty="0"/>
+                    </a:p>
+                  </a:txBody>
+                  <a:tcPr anchor="ctr"/>
+                </a:tc>
+                <a:tc>
+                  <a:txBody>
+                    <a:bodyPr/>
+                    <a:lstStyle/>
+                    <a:p>
+                      <a:pPr algn="ctr"/>
+                      <a:r>
+                        <a:rPr lang="en-AU" dirty="0" smtClean="0"/>
+                        <a:t>1</a:t>
+                      </a:r>
+                      <a:endParaRPr lang="en-AU" dirty="0"/>
+                    </a:p>
+                  </a:txBody>
+                  <a:tcPr anchor="ctr"/>
+                </a:tc>
+                <a:tc>
+                  <a:txBody>
+                    <a:bodyPr/>
+                    <a:lstStyle/>
+                    <a:p>
+                      <a:pPr algn="ctr"/>
+                      <a:r>
+                        <a:rPr lang="en-AU" dirty="0" smtClean="0"/>
+                        <a:t>0</a:t>
+                      </a:r>
+                      <a:endParaRPr lang="en-AU" dirty="0"/>
+                    </a:p>
+                  </a:txBody>
+                  <a:tcPr anchor="ctr"/>
+                </a:tc>
+                <a:tc>
+                  <a:txBody>
+                    <a:bodyPr/>
+                    <a:lstStyle/>
+                    <a:p>
+                      <a:pPr algn="ctr"/>
+                      <a:r>
+                        <a:rPr lang="en-AU" dirty="0" smtClean="0"/>
+                        <a:t>1</a:t>
+                      </a:r>
+                      <a:endParaRPr lang="en-AU" dirty="0"/>
+                    </a:p>
+                  </a:txBody>
+                  <a:tcPr anchor="ctr"/>
+                </a:tc>
+                <a:tc>
+                  <a:txBody>
+                    <a:bodyPr/>
+                    <a:lstStyle/>
+                    <a:p>
+                      <a:pPr algn="ctr"/>
+                      <a:r>
+                        <a:rPr lang="en-AU" dirty="0" smtClean="0"/>
+                        <a:t>0</a:t>
+                      </a:r>
+                      <a:endParaRPr lang="en-AU" dirty="0"/>
+                    </a:p>
+                  </a:txBody>
+                  <a:tcPr anchor="ctr"/>
+                </a:tc>
+              </a:tr>
+              <a:tr h="576000">
+                <a:tc>
+                  <a:txBody>
+                    <a:bodyPr/>
+                    <a:lstStyle/>
+                    <a:p>
+                      <a:pPr algn="ctr"/>
+                      <a:r>
+                        <a:rPr lang="en-AU" dirty="0" smtClean="0"/>
+                        <a:t>1</a:t>
+                      </a:r>
+                      <a:endParaRPr lang="en-AU" dirty="0"/>
+                    </a:p>
+                  </a:txBody>
+                  <a:tcPr anchor="ctr"/>
+                </a:tc>
+                <a:tc>
+                  <a:txBody>
+                    <a:bodyPr/>
+                    <a:lstStyle/>
+                    <a:p>
+                      <a:pPr algn="ctr"/>
+                      <a:r>
+                        <a:rPr lang="en-AU" dirty="0" smtClean="0"/>
+                        <a:t>0</a:t>
+                      </a:r>
+                      <a:endParaRPr lang="en-AU" dirty="0"/>
+                    </a:p>
+                  </a:txBody>
+                  <a:tcPr anchor="ctr"/>
+                </a:tc>
+                <a:tc>
+                  <a:txBody>
+                    <a:bodyPr/>
+                    <a:lstStyle/>
+                    <a:p>
+                      <a:pPr algn="ctr"/>
+                      <a:r>
+                        <a:rPr lang="en-AU" dirty="0" smtClean="0"/>
+                        <a:t>0</a:t>
+                      </a:r>
+                      <a:endParaRPr lang="en-AU" dirty="0"/>
+                    </a:p>
+                  </a:txBody>
+                  <a:tcPr anchor="ctr"/>
+                </a:tc>
+                <a:tc>
+                  <a:txBody>
+                    <a:bodyPr/>
+                    <a:lstStyle/>
+                    <a:p>
+                      <a:pPr algn="ctr"/>
+                      <a:r>
+                        <a:rPr lang="en-AU" dirty="0" smtClean="0"/>
+                        <a:t>0</a:t>
+                      </a:r>
+                      <a:endParaRPr lang="en-AU" dirty="0"/>
+                    </a:p>
+                  </a:txBody>
+                  <a:tcPr anchor="ctr"/>
+                </a:tc>
+                <a:tc>
+                  <a:txBody>
+                    <a:bodyPr/>
+                    <a:lstStyle/>
+                    <a:p>
+                      <a:pPr algn="ctr"/>
+                      <a:r>
+                        <a:rPr lang="en-AU" dirty="0" smtClean="0"/>
+                        <a:t>1</a:t>
+                      </a:r>
+                      <a:endParaRPr lang="en-AU" dirty="0"/>
+                    </a:p>
+                  </a:txBody>
+                  <a:tcPr anchor="ctr"/>
+                </a:tc>
+              </a:tr>
+            </a:tbl>
+          </a:graphicData>
+        </a:graphic>
+      </p:graphicFrame>
+      <p:pic>
+        <p:nvPicPr>
+          <p:cNvPr id="3" name="Picture 2"/>
+          <p:cNvPicPr>
+            <a:picLocks noChangeAspect="1"/>
+          </p:cNvPicPr>
+          <p:nvPr/>
+        </p:nvPicPr>
+        <p:blipFill>
+          <a:blip r:embed="rId2" cstate="print">
+            <a:extLst>
+              <a:ext uri="{28A0092B-C50C-407E-A947-70E740481C1C}">
+                <a14:useLocalDpi xmlns:a14="http://schemas.microsoft.com/office/drawing/2010/main" val="0"/>
+              </a:ext>
+            </a:extLst>
+          </a:blip>
+          <a:stretch>
+            <a:fillRect/>
+          </a:stretch>
+        </p:blipFill>
+        <p:spPr>
+          <a:xfrm>
+            <a:off x="2942167" y="996950"/>
+            <a:ext cx="444500" cy="444500"/>
+          </a:xfrm>
+          <a:prstGeom prst="rect">
+            <a:avLst/>
+          </a:prstGeom>
+        </p:spPr>
+      </p:pic>
+      <p:pic>
+        <p:nvPicPr>
+          <p:cNvPr id="12" name="Picture 11"/>
+          <p:cNvPicPr>
+            <a:picLocks noChangeAspect="1"/>
+          </p:cNvPicPr>
+          <p:nvPr/>
+        </p:nvPicPr>
+        <p:blipFill>
+          <a:blip r:embed="rId2" cstate="print">
+            <a:extLst>
+              <a:ext uri="{28A0092B-C50C-407E-A947-70E740481C1C}">
+                <a14:useLocalDpi xmlns:a14="http://schemas.microsoft.com/office/drawing/2010/main" val="0"/>
+              </a:ext>
+            </a:extLst>
+          </a:blip>
+          <a:stretch>
+            <a:fillRect/>
+          </a:stretch>
+        </p:blipFill>
+        <p:spPr>
+          <a:xfrm>
+            <a:off x="5269716" y="996950"/>
+            <a:ext cx="444500" cy="444500"/>
+          </a:xfrm>
+          <a:prstGeom prst="rect">
+            <a:avLst/>
+          </a:prstGeom>
+        </p:spPr>
+      </p:pic>
+      <p:pic>
+        <p:nvPicPr>
+          <p:cNvPr id="13" name="Picture 12"/>
+          <p:cNvPicPr>
+            <a:picLocks noChangeAspect="1"/>
+          </p:cNvPicPr>
+          <p:nvPr/>
+        </p:nvPicPr>
+        <p:blipFill>
+          <a:blip r:embed="rId2" cstate="print">
+            <a:extLst>
+              <a:ext uri="{28A0092B-C50C-407E-A947-70E740481C1C}">
+                <a14:useLocalDpi xmlns:a14="http://schemas.microsoft.com/office/drawing/2010/main" val="0"/>
+              </a:ext>
+            </a:extLst>
+          </a:blip>
+          <a:stretch>
+            <a:fillRect/>
+          </a:stretch>
+        </p:blipFill>
+        <p:spPr>
+          <a:xfrm>
+            <a:off x="3524054" y="996950"/>
+            <a:ext cx="444500" cy="444500"/>
+          </a:xfrm>
+          <a:prstGeom prst="rect">
+            <a:avLst/>
+          </a:prstGeom>
+        </p:spPr>
+      </p:pic>
+      <p:pic>
+        <p:nvPicPr>
+          <p:cNvPr id="14" name="Picture 13"/>
+          <p:cNvPicPr>
+            <a:picLocks noChangeAspect="1"/>
+          </p:cNvPicPr>
+          <p:nvPr/>
+        </p:nvPicPr>
+        <p:blipFill>
+          <a:blip r:embed="rId2" cstate="print">
+            <a:extLst>
+              <a:ext uri="{28A0092B-C50C-407E-A947-70E740481C1C}">
+                <a14:useLocalDpi xmlns:a14="http://schemas.microsoft.com/office/drawing/2010/main" val="0"/>
+              </a:ext>
+            </a:extLst>
+          </a:blip>
+          <a:stretch>
+            <a:fillRect/>
+          </a:stretch>
+        </p:blipFill>
+        <p:spPr>
+          <a:xfrm>
+            <a:off x="4105941" y="996950"/>
+            <a:ext cx="444500" cy="444500"/>
+          </a:xfrm>
+          <a:prstGeom prst="rect">
+            <a:avLst/>
+          </a:prstGeom>
+        </p:spPr>
+      </p:pic>
+      <p:pic>
+        <p:nvPicPr>
+          <p:cNvPr id="15" name="Picture 14"/>
+          <p:cNvPicPr>
+            <a:picLocks noChangeAspect="1"/>
+          </p:cNvPicPr>
+          <p:nvPr/>
+        </p:nvPicPr>
+        <p:blipFill>
+          <a:blip r:embed="rId2" cstate="print">
+            <a:extLst>
+              <a:ext uri="{28A0092B-C50C-407E-A947-70E740481C1C}">
+                <a14:useLocalDpi xmlns:a14="http://schemas.microsoft.com/office/drawing/2010/main" val="0"/>
+              </a:ext>
+            </a:extLst>
+          </a:blip>
+          <a:stretch>
+            <a:fillRect/>
+          </a:stretch>
+        </p:blipFill>
+        <p:spPr>
+          <a:xfrm>
+            <a:off x="4687828" y="996950"/>
+            <a:ext cx="444500" cy="444500"/>
+          </a:xfrm>
+          <a:prstGeom prst="rect">
+            <a:avLst/>
+          </a:prstGeom>
+        </p:spPr>
+      </p:pic>
+      <p:graphicFrame>
+        <p:nvGraphicFramePr>
+          <p:cNvPr id="16" name="Table 15"/>
+          <p:cNvGraphicFramePr>
+            <a:graphicFrameLocks noGrp="1"/>
+          </p:cNvGraphicFramePr>
+          <p:nvPr>
+            <p:extLst>
+              <p:ext uri="{D42A27DB-BD31-4B8C-83A1-F6EECF244321}">
+                <p14:modId xmlns:p14="http://schemas.microsoft.com/office/powerpoint/2010/main" val="889299655"/>
+              </p:ext>
+            </p:extLst>
+          </p:nvPr>
+        </p:nvGraphicFramePr>
+        <p:xfrm>
+          <a:off x="5896053" y="1447800"/>
+          <a:ext cx="576000" cy="2880000"/>
+        </p:xfrm>
+        <a:graphic>
+          <a:graphicData uri="http://schemas.openxmlformats.org/drawingml/2006/table">
+            <a:tbl>
+              <a:tblPr firstRow="1" bandRow="1"/>
+              <a:tblGrid>
+                <a:gridCol w="576000"/>
+              </a:tblGrid>
+              <a:tr h="576000">
+                <a:tc>
+                  <a:txBody>
+                    <a:bodyPr/>
+                    <a:lstStyle/>
+                    <a:p>
+                      <a:pPr algn="ctr"/>
+                      <a:r>
+                        <a:rPr lang="en-AU" dirty="0" smtClean="0"/>
+                        <a:t>7.4</a:t>
+                      </a:r>
+                      <a:endParaRPr lang="en-AU" dirty="0"/>
+                    </a:p>
+                  </a:txBody>
+                  <a:tcPr anchor="ctr"/>
+                </a:tc>
+              </a:tr>
+              <a:tr h="576000">
+                <a:tc>
+                  <a:txBody>
+                    <a:bodyPr/>
+                    <a:lstStyle/>
+                    <a:p>
+                      <a:pPr algn="ctr"/>
+                      <a:r>
+                        <a:rPr lang="en-AU" dirty="0" smtClean="0"/>
+                        <a:t>55</a:t>
+                      </a:r>
+                      <a:endParaRPr lang="en-AU" dirty="0"/>
+                    </a:p>
+                  </a:txBody>
+                  <a:tcPr anchor="ctr"/>
+                </a:tc>
+              </a:tr>
+              <a:tr h="576000">
+                <a:tc>
+                  <a:txBody>
+                    <a:bodyPr/>
+                    <a:lstStyle/>
+                    <a:p>
+                      <a:pPr algn="ctr"/>
+                      <a:r>
+                        <a:rPr lang="en-AU" dirty="0" smtClean="0"/>
+                        <a:t>1</a:t>
+                      </a:r>
+                      <a:endParaRPr lang="en-AU" dirty="0"/>
+                    </a:p>
+                  </a:txBody>
+                  <a:tcPr anchor="ctr"/>
+                </a:tc>
+              </a:tr>
+              <a:tr h="576000">
+                <a:tc>
+                  <a:txBody>
+                    <a:bodyPr/>
+                    <a:lstStyle/>
+                    <a:p>
+                      <a:pPr algn="ctr"/>
+                      <a:r>
+                        <a:rPr lang="en-AU" dirty="0" smtClean="0"/>
+                        <a:t>0</a:t>
+                      </a:r>
+                      <a:endParaRPr lang="en-AU" dirty="0"/>
+                    </a:p>
+                  </a:txBody>
+                  <a:tcPr anchor="ctr"/>
+                </a:tc>
+              </a:tr>
+              <a:tr h="576000">
+                <a:tc>
+                  <a:txBody>
+                    <a:bodyPr/>
+                    <a:lstStyle/>
+                    <a:p>
+                      <a:pPr algn="ctr"/>
+                      <a:r>
+                        <a:rPr lang="en-AU" dirty="0" smtClean="0"/>
+                        <a:t>0</a:t>
+                      </a:r>
+                      <a:endParaRPr lang="en-AU" dirty="0"/>
+                    </a:p>
+                  </a:txBody>
+                  <a:tcPr anchor="ctr"/>
+                </a:tc>
+              </a:tr>
+            </a:tbl>
+          </a:graphicData>
+        </a:graphic>
+      </p:graphicFrame>
+      <p:pic>
+        <p:nvPicPr>
+          <p:cNvPr id="17" name="Picture 16"/>
+          <p:cNvPicPr>
+            <a:picLocks noChangeAspect="1"/>
+          </p:cNvPicPr>
+          <p:nvPr/>
+        </p:nvPicPr>
+        <p:blipFill>
+          <a:blip r:embed="rId2" cstate="print">
+            <a:extLst>
+              <a:ext uri="{28A0092B-C50C-407E-A947-70E740481C1C}">
+                <a14:useLocalDpi xmlns:a14="http://schemas.microsoft.com/office/drawing/2010/main" val="0"/>
+              </a:ext>
+            </a:extLst>
+          </a:blip>
+          <a:stretch>
+            <a:fillRect/>
+          </a:stretch>
+        </p:blipFill>
+        <p:spPr>
+          <a:xfrm>
+            <a:off x="5961803" y="996950"/>
+            <a:ext cx="444500" cy="444500"/>
+          </a:xfrm>
+          <a:prstGeom prst="rect">
+            <a:avLst/>
+          </a:prstGeom>
+        </p:spPr>
+      </p:pic>
+      <p:sp>
+        <p:nvSpPr>
+          <p:cNvPr id="4" name="TextBox 3"/>
+          <p:cNvSpPr txBox="1"/>
+          <p:nvPr/>
+        </p:nvSpPr>
+        <p:spPr>
+          <a:xfrm>
+            <a:off x="1354669" y="1540934"/>
+            <a:ext cx="1514572" cy="369332"/>
+          </a:xfrm>
+          <a:prstGeom prst="rect">
+            <a:avLst/>
+          </a:prstGeom>
+          <a:noFill/>
+        </p:spPr>
+        <p:txBody>
+          <a:bodyPr wrap="square" rtlCol="0">
+            <a:spAutoFit/>
+          </a:bodyPr>
+          <a:lstStyle/>
+          <a:p>
+            <a:pPr algn="r"/>
+            <a:r>
+              <a:rPr lang="en-AU" dirty="0" smtClean="0"/>
+              <a:t>IMDB score</a:t>
+            </a:r>
+            <a:endParaRPr lang="en-AU" dirty="0"/>
+          </a:p>
+        </p:txBody>
+      </p:sp>
+      <p:sp>
+        <p:nvSpPr>
+          <p:cNvPr id="18" name="TextBox 17"/>
+          <p:cNvSpPr txBox="1"/>
+          <p:nvPr/>
+        </p:nvSpPr>
+        <p:spPr>
+          <a:xfrm>
+            <a:off x="1354669" y="2124718"/>
+            <a:ext cx="1514572" cy="369332"/>
+          </a:xfrm>
+          <a:prstGeom prst="rect">
+            <a:avLst/>
+          </a:prstGeom>
+          <a:noFill/>
+        </p:spPr>
+        <p:txBody>
+          <a:bodyPr wrap="square" rtlCol="0">
+            <a:spAutoFit/>
+          </a:bodyPr>
+          <a:lstStyle/>
+          <a:p>
+            <a:pPr algn="r"/>
+            <a:r>
+              <a:rPr lang="en-AU" dirty="0" smtClean="0"/>
+              <a:t>N reviews</a:t>
+            </a:r>
+            <a:endParaRPr lang="en-AU" dirty="0"/>
+          </a:p>
+        </p:txBody>
+      </p:sp>
+      <p:sp>
+        <p:nvSpPr>
+          <p:cNvPr id="19" name="TextBox 18"/>
+          <p:cNvSpPr txBox="1"/>
+          <p:nvPr/>
+        </p:nvSpPr>
+        <p:spPr>
+          <a:xfrm>
+            <a:off x="1354669" y="2708502"/>
+            <a:ext cx="1514572" cy="369332"/>
+          </a:xfrm>
+          <a:prstGeom prst="rect">
+            <a:avLst/>
+          </a:prstGeom>
+          <a:noFill/>
+        </p:spPr>
+        <p:txBody>
+          <a:bodyPr wrap="square" rtlCol="0">
+            <a:spAutoFit/>
+          </a:bodyPr>
+          <a:lstStyle/>
+          <a:p>
+            <a:pPr algn="r"/>
+            <a:r>
+              <a:rPr lang="en-AU" dirty="0" smtClean="0"/>
+              <a:t>Action</a:t>
+            </a:r>
+            <a:endParaRPr lang="en-AU" dirty="0"/>
+          </a:p>
+        </p:txBody>
+      </p:sp>
+      <p:sp>
+        <p:nvSpPr>
+          <p:cNvPr id="20" name="TextBox 19"/>
+          <p:cNvSpPr txBox="1"/>
+          <p:nvPr/>
+        </p:nvSpPr>
+        <p:spPr>
+          <a:xfrm>
+            <a:off x="1354669" y="3292286"/>
+            <a:ext cx="1514572" cy="369332"/>
+          </a:xfrm>
+          <a:prstGeom prst="rect">
+            <a:avLst/>
+          </a:prstGeom>
+          <a:noFill/>
+        </p:spPr>
+        <p:txBody>
+          <a:bodyPr wrap="square" rtlCol="0">
+            <a:spAutoFit/>
+          </a:bodyPr>
+          <a:lstStyle/>
+          <a:p>
+            <a:pPr algn="r"/>
+            <a:r>
+              <a:rPr lang="en-AU" dirty="0" smtClean="0"/>
+              <a:t>Comedy</a:t>
+            </a:r>
+            <a:endParaRPr lang="en-AU" dirty="0"/>
+          </a:p>
+        </p:txBody>
+      </p:sp>
+      <p:sp>
+        <p:nvSpPr>
+          <p:cNvPr id="21" name="TextBox 20"/>
+          <p:cNvSpPr txBox="1"/>
+          <p:nvPr/>
+        </p:nvSpPr>
+        <p:spPr>
+          <a:xfrm>
+            <a:off x="1354669" y="3876070"/>
+            <a:ext cx="1514572" cy="369332"/>
+          </a:xfrm>
+          <a:prstGeom prst="rect">
+            <a:avLst/>
+          </a:prstGeom>
+          <a:noFill/>
+        </p:spPr>
+        <p:txBody>
+          <a:bodyPr wrap="square" rtlCol="0">
+            <a:spAutoFit/>
+          </a:bodyPr>
+          <a:lstStyle/>
+          <a:p>
+            <a:pPr algn="r"/>
+            <a:r>
+              <a:rPr lang="en-AU" dirty="0" smtClean="0"/>
+              <a:t>Romance</a:t>
+            </a:r>
+            <a:endParaRPr lang="en-AU" dirty="0"/>
+          </a:p>
+        </p:txBody>
+      </p:sp>
+    </p:spTree>
+    <p:extLst>
+      <p:ext uri="{BB962C8B-B14F-4D97-AF65-F5344CB8AC3E}">
+        <p14:creationId xmlns:p14="http://schemas.microsoft.com/office/powerpoint/2010/main" val="3735671847"/>
+      </p:ext>
+    </p:extLst>
+  </p:cSld>
+  <p:clrMapOvr>
+    <a:masterClrMapping/>
+  </p:clrMapOvr>
+</p:sld>
+</file>
+
 <file path=ppt/theme/theme1.xml><?xml version="1.0" encoding="utf-8"?>
 <a:theme xmlns:a="http://schemas.openxmlformats.org/drawingml/2006/main" name="Office Theme">
   <a:themeElements>

</xml_diff>